<commit_message>
presentation few changes WIP
</commit_message>
<xml_diff>
--- a/defense/presentation.pptx
+++ b/defense/presentation.pptx
@@ -9,9 +9,9 @@
     <p:sldId id="257" r:id="rId3"/>
     <p:sldId id="258" r:id="rId4"/>
     <p:sldId id="259" r:id="rId5"/>
-    <p:sldId id="260" r:id="rId6"/>
-    <p:sldId id="261" r:id="rId7"/>
-    <p:sldId id="262" r:id="rId8"/>
+    <p:sldId id="261" r:id="rId6"/>
+    <p:sldId id="262" r:id="rId7"/>
+    <p:sldId id="266" r:id="rId8"/>
     <p:sldId id="263" r:id="rId9"/>
     <p:sldId id="264" r:id="rId10"/>
     <p:sldId id="265" r:id="rId11"/>
@@ -113,6 +113,11 @@
       </a:defRPr>
     </a:lvl9pPr>
   </p:defaultTextStyle>
+  <p:extLst>
+    <p:ext uri="{EFAFB233-063F-42B5-8137-9DF3F51BA10A}">
+      <p15:sldGuideLst xmlns:p15="http://schemas.microsoft.com/office/powerpoint/2012/main"/>
+    </p:ext>
+  </p:extLst>
 </p:presentation>
 </file>
 
@@ -342,7 +347,7 @@
           <a:p>
             <a:fld id="{289E67FE-9CEA-45BA-984F-CF9C398FC91B}" type="datetimeFigureOut">
               <a:rPr lang="cs-CZ" smtClean="0"/>
-              <a:t>10.11.2019</a:t>
+              <a:t>08.12.2019</a:t>
             </a:fld>
             <a:endParaRPr lang="cs-CZ"/>
           </a:p>
@@ -550,7 +555,7 @@
           <a:p>
             <a:fld id="{289E67FE-9CEA-45BA-984F-CF9C398FC91B}" type="datetimeFigureOut">
               <a:rPr lang="cs-CZ" smtClean="0"/>
-              <a:t>10.11.2019</a:t>
+              <a:t>08.12.2019</a:t>
             </a:fld>
             <a:endParaRPr lang="cs-CZ"/>
           </a:p>
@@ -806,7 +811,7 @@
           <a:p>
             <a:fld id="{289E67FE-9CEA-45BA-984F-CF9C398FC91B}" type="datetimeFigureOut">
               <a:rPr lang="cs-CZ" smtClean="0"/>
-              <a:t>10.11.2019</a:t>
+              <a:t>08.12.2019</a:t>
             </a:fld>
             <a:endParaRPr lang="cs-CZ"/>
           </a:p>
@@ -976,7 +981,7 @@
           <a:p>
             <a:fld id="{289E67FE-9CEA-45BA-984F-CF9C398FC91B}" type="datetimeFigureOut">
               <a:rPr lang="cs-CZ" smtClean="0"/>
-              <a:t>10.11.2019</a:t>
+              <a:t>08.12.2019</a:t>
             </a:fld>
             <a:endParaRPr lang="cs-CZ"/>
           </a:p>
@@ -1311,7 +1316,7 @@
           <a:p>
             <a:fld id="{289E67FE-9CEA-45BA-984F-CF9C398FC91B}" type="datetimeFigureOut">
               <a:rPr lang="cs-CZ" smtClean="0"/>
-              <a:t>10.11.2019</a:t>
+              <a:t>08.12.2019</a:t>
             </a:fld>
             <a:endParaRPr lang="cs-CZ"/>
           </a:p>
@@ -1586,7 +1591,7 @@
           <a:p>
             <a:fld id="{289E67FE-9CEA-45BA-984F-CF9C398FC91B}" type="datetimeFigureOut">
               <a:rPr lang="cs-CZ" smtClean="0"/>
-              <a:t>10.11.2019</a:t>
+              <a:t>08.12.2019</a:t>
             </a:fld>
             <a:endParaRPr lang="cs-CZ"/>
           </a:p>
@@ -1965,7 +1970,7 @@
           <a:p>
             <a:fld id="{289E67FE-9CEA-45BA-984F-CF9C398FC91B}" type="datetimeFigureOut">
               <a:rPr lang="cs-CZ" smtClean="0"/>
-              <a:t>10.11.2019</a:t>
+              <a:t>08.12.2019</a:t>
             </a:fld>
             <a:endParaRPr lang="cs-CZ"/>
           </a:p>
@@ -2083,7 +2088,7 @@
           <a:p>
             <a:fld id="{289E67FE-9CEA-45BA-984F-CF9C398FC91B}" type="datetimeFigureOut">
               <a:rPr lang="cs-CZ" smtClean="0"/>
-              <a:t>10.11.2019</a:t>
+              <a:t>08.12.2019</a:t>
             </a:fld>
             <a:endParaRPr lang="cs-CZ"/>
           </a:p>
@@ -2254,7 +2259,7 @@
           <a:p>
             <a:fld id="{289E67FE-9CEA-45BA-984F-CF9C398FC91B}" type="datetimeFigureOut">
               <a:rPr lang="cs-CZ" smtClean="0"/>
-              <a:t>10.11.2019</a:t>
+              <a:t>08.12.2019</a:t>
             </a:fld>
             <a:endParaRPr lang="cs-CZ"/>
           </a:p>
@@ -2608,7 +2613,7 @@
           <a:p>
             <a:fld id="{289E67FE-9CEA-45BA-984F-CF9C398FC91B}" type="datetimeFigureOut">
               <a:rPr lang="cs-CZ" smtClean="0"/>
-              <a:t>10.11.2019</a:t>
+              <a:t>08.12.2019</a:t>
             </a:fld>
             <a:endParaRPr lang="cs-CZ"/>
           </a:p>
@@ -2985,7 +2990,7 @@
           <a:p>
             <a:fld id="{289E67FE-9CEA-45BA-984F-CF9C398FC91B}" type="datetimeFigureOut">
               <a:rPr lang="cs-CZ" smtClean="0"/>
-              <a:t>10.11.2019</a:t>
+              <a:t>08.12.2019</a:t>
             </a:fld>
             <a:endParaRPr lang="cs-CZ"/>
           </a:p>
@@ -3272,7 +3277,7 @@
           <a:p>
             <a:fld id="{289E67FE-9CEA-45BA-984F-CF9C398FC91B}" type="datetimeFigureOut">
               <a:rPr lang="cs-CZ" smtClean="0"/>
-              <a:t>10.11.2019</a:t>
+              <a:t>08.12.2019</a:t>
             </a:fld>
             <a:endParaRPr lang="cs-CZ"/>
           </a:p>
@@ -3973,34 +3978,6 @@
           <a:bodyPr/>
           <a:lstStyle/>
           <a:p>
-            <a:r>
-              <a:rPr lang="cs-CZ" dirty="0"/>
-              <a:t>//TODO</a:t>
-            </a:r>
-          </a:p>
-          <a:p>
-            <a:r>
-              <a:rPr lang="cs-CZ" dirty="0"/>
-              <a:t>//první verze večer to eště trochu poupravím</a:t>
-            </a:r>
-          </a:p>
-          <a:p>
-            <a:r>
-              <a:rPr lang="cs-CZ" dirty="0"/>
-              <a:t>//jestli neotevřeš .</a:t>
-            </a:r>
-            <a:r>
-              <a:rPr lang="cs-CZ" dirty="0" err="1"/>
-              <a:t>pptx</a:t>
-            </a:r>
-            <a:r>
-              <a:rPr lang="cs-CZ" dirty="0"/>
-              <a:t> tak mi napiš v jakým formátu to </a:t>
-            </a:r>
-            <a:r>
-              <a:rPr lang="cs-CZ"/>
-              <a:t>potřebuješ vyexportovat</a:t>
-            </a:r>
             <a:endParaRPr lang="cs-CZ" dirty="0"/>
           </a:p>
         </p:txBody>
@@ -4082,7 +4059,7 @@
         <p:spPr/>
         <p:txBody>
           <a:bodyPr>
-            <a:normAutofit/>
+            <a:normAutofit fontScale="92500"/>
           </a:bodyPr>
           <a:lstStyle/>
           <a:p>
@@ -4123,20 +4100,44 @@
               <a:t> v grafu </a:t>
             </a:r>
             <a:r>
-              <a:rPr lang="cs-CZ" sz="2400" i="1" dirty="0"/>
+              <a:rPr lang="cs-CZ" sz="2400" b="1" dirty="0"/>
               <a:t>G</a:t>
             </a:r>
             <a:r>
               <a:rPr lang="cs-CZ" sz="2400" dirty="0"/>
-              <a:t> je cesta, která obsahuje každý uzel grafu </a:t>
-            </a:r>
-            <a:r>
-              <a:rPr lang="cs-CZ" sz="2400" i="1" dirty="0"/>
-              <a:t>G </a:t>
+              <a:t> je cesta, která obsahuje každý vrchol </a:t>
+            </a:r>
+            <a:r>
+              <a:rPr lang="cs-CZ" sz="2400" b="1" dirty="0"/>
+              <a:t>V</a:t>
             </a:r>
             <a:r>
               <a:rPr lang="cs-CZ" sz="2400" dirty="0"/>
-              <a:t>právě jednou</a:t>
+              <a:t> </a:t>
+            </a:r>
+            <a:r>
+              <a:rPr lang="cs-CZ" sz="2400" dirty="0" err="1"/>
+              <a:t>v</a:t>
+            </a:r>
+            <a:r>
+              <a:rPr lang="cs-CZ" sz="2400" dirty="0"/>
+              <a:t> grafu </a:t>
+            </a:r>
+            <a:r>
+              <a:rPr lang="cs-CZ" sz="2400" b="1" dirty="0"/>
+              <a:t>G</a:t>
+            </a:r>
+            <a:r>
+              <a:rPr lang="cs-CZ" sz="2400" dirty="0"/>
+              <a:t> právě jednou a žádná z využitých cest </a:t>
+            </a:r>
+            <a:r>
+              <a:rPr lang="cs-CZ" sz="2400" b="1" dirty="0"/>
+              <a:t>P</a:t>
+            </a:r>
+            <a:r>
+              <a:rPr lang="cs-CZ" sz="2400" dirty="0"/>
+              <a:t> se neopakuje</a:t>
             </a:r>
           </a:p>
           <a:p>
@@ -4146,21 +4147,67 @@
             </a:pPr>
             <a:r>
               <a:rPr lang="cs-CZ" sz="2400" dirty="0"/>
-              <a:t> Pro převod úloh stačí dát všem hranám délku 1, pokud v grafu existuje cesta délky </a:t>
-            </a:r>
-            <a:r>
-              <a:rPr lang="cs-CZ" sz="2400" b="1" i="1" dirty="0"/>
-              <a:t>U – 1</a:t>
+              <a:t>pokud v grafu </a:t>
+            </a:r>
+            <a:r>
+              <a:rPr lang="cs-CZ" sz="2400" b="1" dirty="0"/>
+              <a:t>G</a:t>
             </a:r>
             <a:r>
               <a:rPr lang="cs-CZ" sz="2400" dirty="0"/>
-              <a:t>, tak je z definice cesty zřejmé, že je </a:t>
+              <a:t> existuje cesta délky </a:t>
+            </a:r>
+            <a:r>
+              <a:rPr lang="cs-CZ" sz="2400" b="1" dirty="0"/>
+              <a:t>V – 1 </a:t>
+            </a:r>
+            <a:r>
+              <a:rPr lang="cs-CZ" sz="2400" dirty="0"/>
+              <a:t>splňující první bod, je </a:t>
+            </a:r>
+            <a:r>
+              <a:rPr lang="cs-CZ" sz="2400" b="1" dirty="0"/>
+              <a:t>cesta</a:t>
+            </a:r>
+            <a:r>
+              <a:rPr lang="cs-CZ" sz="2400" dirty="0"/>
+              <a:t> </a:t>
             </a:r>
             <a:r>
               <a:rPr lang="cs-CZ" sz="2400" dirty="0" err="1"/>
-              <a:t>hamiltonovská</a:t>
+              <a:t>Hamiltonovská</a:t>
             </a:r>
             <a:endParaRPr lang="cs-CZ" sz="2400" dirty="0"/>
+          </a:p>
+          <a:p>
+            <a:pPr>
+              <a:buFont typeface="Arial" panose="020B0604020202020204" pitchFamily="34" charset="0"/>
+              <a:buChar char="•"/>
+            </a:pPr>
+            <a:r>
+              <a:rPr lang="cs-CZ" sz="2400" dirty="0"/>
+              <a:t>pokud začíná a končí ve stejném vrcholu a je délky </a:t>
+            </a:r>
+            <a:r>
+              <a:rPr lang="cs-CZ" sz="2400" b="1" dirty="0"/>
+              <a:t>V</a:t>
+            </a:r>
+            <a:r>
+              <a:rPr lang="cs-CZ" sz="2400" dirty="0"/>
+              <a:t>, jedná se o </a:t>
+            </a:r>
+            <a:r>
+              <a:rPr lang="cs-CZ" sz="2400" b="1" dirty="0"/>
+              <a:t>cyklus</a:t>
+            </a:r>
+            <a:r>
+              <a:rPr lang="cs-CZ" sz="2400" dirty="0"/>
+              <a:t>, kterého délka je </a:t>
+            </a:r>
+            <a:r>
+              <a:rPr lang="cs-CZ" sz="2400" b="1" dirty="0"/>
+              <a:t>V</a:t>
+            </a:r>
           </a:p>
           <a:p>
             <a:pPr>
@@ -4283,19 +4330,17 @@
             <a:endParaRPr lang="cs-CZ" sz="2400" u="sng" dirty="0"/>
           </a:p>
           <a:p>
-            <a:pPr marL="0" indent="0">
-              <a:buNone/>
-            </a:pPr>
-            <a:endParaRPr lang="cs-CZ" sz="2400" u="sng" dirty="0"/>
-          </a:p>
-          <a:p>
             <a:pPr marL="457200" indent="-457200">
               <a:buFont typeface="+mj-lt"/>
               <a:buAutoNum type="arabicPeriod"/>
             </a:pPr>
             <a:r>
               <a:rPr lang="cs-CZ" sz="2400" dirty="0"/>
-              <a:t>Počet uzlů v grafu musí být větší než 2</a:t>
+              <a:t>Počet vrcholů </a:t>
+            </a:r>
+            <a:r>
+              <a:rPr lang="cs-CZ" sz="2400" b="1" dirty="0"/>
+              <a:t>&gt; 2</a:t>
             </a:r>
           </a:p>
           <a:p>
@@ -4305,15 +4350,11 @@
             </a:pPr>
             <a:r>
               <a:rPr lang="cs-CZ" sz="2400" dirty="0"/>
-              <a:t>Graf musí mít minimálně stupeň 1 pro každý uzel pro nalezení </a:t>
-            </a:r>
-            <a:r>
-              <a:rPr lang="cs-CZ" sz="2400" dirty="0" err="1"/>
-              <a:t>Hamiltonovi</a:t>
-            </a:r>
-            <a:r>
-              <a:rPr lang="cs-CZ" sz="2400" dirty="0"/>
-              <a:t> cesty</a:t>
+              <a:t>Stupeň každého z vrcholů pro cestu </a:t>
+            </a:r>
+            <a:r>
+              <a:rPr lang="cs-CZ" sz="2400" b="1" dirty="0"/>
+              <a:t>&gt;= 1</a:t>
             </a:r>
           </a:p>
           <a:p>
@@ -4323,15 +4364,40 @@
             </a:pPr>
             <a:r>
               <a:rPr lang="cs-CZ" sz="2400" dirty="0"/>
-              <a:t>Graf musí mít pro každý uzel minimálně stupeň 2 pro nalezení </a:t>
-            </a:r>
-            <a:r>
-              <a:rPr lang="cs-CZ" sz="2400" dirty="0" err="1"/>
-              <a:t>Hamiltonova</a:t>
+              <a:t>Stupeň každého z vrcholů pro cyklus </a:t>
+            </a:r>
+            <a:r>
+              <a:rPr lang="cs-CZ" sz="2400" b="1" dirty="0"/>
+              <a:t>&gt;= 2</a:t>
+            </a:r>
+          </a:p>
+          <a:p>
+            <a:pPr marL="457200" indent="-457200">
+              <a:buFont typeface="+mj-lt"/>
+              <a:buAutoNum type="arabicPeriod"/>
+            </a:pPr>
+            <a:endParaRPr lang="cs-CZ" sz="2400" b="1" dirty="0"/>
+          </a:p>
+          <a:p>
+            <a:pPr marL="0" indent="0">
+              <a:buNone/>
+            </a:pPr>
+            <a:r>
+              <a:rPr lang="cs-CZ" sz="2400" b="1" dirty="0"/>
+              <a:t>Stupeň vrcholu: </a:t>
             </a:r>
             <a:r>
               <a:rPr lang="cs-CZ" sz="2400" dirty="0"/>
-              <a:t> cyklu</a:t>
+              <a:t>počet hran, které jsou s daným vrcholem spojené</a:t>
+            </a:r>
+          </a:p>
+          <a:p>
+            <a:pPr marL="0" indent="0">
+              <a:buNone/>
+            </a:pPr>
+            <a:r>
+              <a:rPr lang="cs-CZ" sz="2400" b="1" dirty="0"/>
+              <a:t>Při nesplnění podmínek se program nespouští!</a:t>
             </a:r>
           </a:p>
         </p:txBody>
@@ -4410,7 +4476,12 @@
             <p:ph idx="1"/>
           </p:nvPr>
         </p:nvSpPr>
-        <p:spPr/>
+        <p:spPr>
+          <a:xfrm>
+            <a:off x="1097280" y="1845734"/>
+            <a:ext cx="10058400" cy="4023360"/>
+          </a:xfrm>
+        </p:spPr>
         <p:txBody>
           <a:bodyPr>
             <a:normAutofit/>
@@ -4426,23 +4497,17 @@
             </a:r>
           </a:p>
           <a:p>
-            <a:pPr marL="0" indent="0">
-              <a:buNone/>
-            </a:pPr>
-            <a:endParaRPr lang="cs-CZ" sz="2400" u="sng" dirty="0"/>
-          </a:p>
-          <a:p>
             <a:pPr marL="457200" indent="-457200" algn="just">
               <a:buFont typeface="+mj-lt"/>
               <a:buAutoNum type="arabicPeriod"/>
             </a:pPr>
             <a:r>
-              <a:rPr lang="cs-CZ" sz="2400" dirty="0" err="1"/>
+              <a:rPr lang="cs-CZ" sz="2400" b="1" dirty="0" err="1"/>
               <a:t>Diracova</a:t>
             </a:r>
             <a:r>
               <a:rPr lang="cs-CZ" sz="2400" dirty="0"/>
-              <a:t> podmínka - každý uzel má stupeň alespoň ½ celkového počtu uzlů</a:t>
+              <a:t> - každý uzel má stupeň alespoň ½ celkového počtu uzlů</a:t>
             </a:r>
           </a:p>
           <a:p>
@@ -4451,12 +4516,12 @@
               <a:buAutoNum type="arabicPeriod"/>
             </a:pPr>
             <a:r>
-              <a:rPr lang="cs-CZ" sz="2400" dirty="0" err="1"/>
+              <a:rPr lang="cs-CZ" sz="2400" b="1" dirty="0" err="1"/>
               <a:t>Oreho</a:t>
             </a:r>
             <a:r>
               <a:rPr lang="cs-CZ" sz="2400" dirty="0"/>
-              <a:t> podmínka - každá dvojice uzlů nespojených hranou má součet stupňů alespoň jako je celkový počet vrcholů</a:t>
+              <a:t> - každá dvojice uzlů nespojených hranou má součet stupňů alespoň jako je celkový počet vrcholů</a:t>
             </a:r>
           </a:p>
           <a:p>
@@ -4465,21 +4530,62 @@
               <a:buAutoNum type="arabicPeriod"/>
             </a:pPr>
             <a:r>
+              <a:rPr lang="cs-CZ" sz="2400" b="1" dirty="0" err="1"/>
+              <a:t>Pósova</a:t>
+            </a:r>
+            <a:r>
+              <a:rPr lang="cs-CZ" sz="2400" dirty="0"/>
+              <a:t> - pro každé přirozené číslo </a:t>
+            </a:r>
+            <a:r>
+              <a:rPr lang="cs-CZ" sz="2400" b="1" dirty="0"/>
+              <a:t>k &lt; ½</a:t>
+            </a:r>
+            <a:r>
+              <a:rPr lang="cs-CZ" sz="2400" dirty="0"/>
+              <a:t> celkového počtu vrcholů existuje počet uzlů, jejichž stupeň nepřevyšuje </a:t>
+            </a:r>
+            <a:r>
+              <a:rPr lang="cs-CZ" sz="2400" b="1" dirty="0"/>
+              <a:t>k</a:t>
+            </a:r>
+            <a:r>
+              <a:rPr lang="cs-CZ" sz="2400" dirty="0"/>
+              <a:t>, menší než </a:t>
+            </a:r>
+            <a:r>
+              <a:rPr lang="cs-CZ" sz="2400" b="1" dirty="0"/>
+              <a:t>k</a:t>
+            </a:r>
+          </a:p>
+          <a:p>
+            <a:pPr marL="457200" indent="-457200" algn="just">
+              <a:buFont typeface="+mj-lt"/>
+              <a:buAutoNum type="arabicPeriod"/>
+            </a:pPr>
+            <a:endParaRPr lang="cs-CZ" sz="2400" b="1" dirty="0"/>
+          </a:p>
+          <a:p>
+            <a:pPr marL="0" indent="0" algn="just">
+              <a:buNone/>
+            </a:pPr>
+            <a:r>
+              <a:rPr lang="cs-CZ" sz="2400" b="1" dirty="0"/>
+              <a:t>Pouze jako informace navíc! </a:t>
+            </a:r>
+            <a:r>
+              <a:rPr lang="cs-CZ" sz="2400" dirty="0"/>
+              <a:t>(při zapnutém </a:t>
+            </a:r>
+            <a:r>
               <a:rPr lang="cs-CZ" sz="2400" dirty="0" err="1"/>
-              <a:t>Pósova</a:t>
+              <a:t>debug</a:t>
             </a:r>
             <a:r>
               <a:rPr lang="cs-CZ" sz="2400" dirty="0"/>
-              <a:t> podmínka - pro každé přirozené číslo k &lt; ½ </a:t>
-            </a:r>
-            <a:r>
-              <a:rPr lang="cs-CZ" sz="2400" dirty="0" err="1"/>
-              <a:t>celkého</a:t>
-            </a:r>
-            <a:r>
-              <a:rPr lang="cs-CZ" sz="2400" dirty="0"/>
-              <a:t> počtu vrcholů existuje počet uzlů, jejichž stupeň nepřevyšuje k, menší než k</a:t>
-            </a:r>
+              <a:t> módu)</a:t>
+            </a:r>
+            <a:endParaRPr lang="cs-CZ" sz="2400" b="1" dirty="0"/>
           </a:p>
           <a:p>
             <a:endParaRPr lang="cs-CZ" sz="2400" dirty="0"/>
@@ -4500,176 +4606,6 @@
 </file>
 
 <file path=ppt/slides/slide5.xml><?xml version="1.0" encoding="utf-8"?>
-<p:sld xmlns:a="http://schemas.openxmlformats.org/drawingml/2006/main" xmlns:r="http://schemas.openxmlformats.org/officeDocument/2006/relationships" xmlns:p="http://schemas.openxmlformats.org/presentationml/2006/main">
-  <p:cSld>
-    <p:spTree>
-      <p:nvGrpSpPr>
-        <p:cNvPr id="1" name=""/>
-        <p:cNvGrpSpPr/>
-        <p:nvPr/>
-      </p:nvGrpSpPr>
-      <p:grpSpPr>
-        <a:xfrm>
-          <a:off x="0" y="0"/>
-          <a:ext cx="0" cy="0"/>
-          <a:chOff x="0" y="0"/>
-          <a:chExt cx="0" cy="0"/>
-        </a:xfrm>
-      </p:grpSpPr>
-      <p:sp>
-        <p:nvSpPr>
-          <p:cNvPr id="2" name="Nadpis 1">
-            <a:extLst>
-              <a:ext uri="{FF2B5EF4-FFF2-40B4-BE49-F238E27FC236}">
-                <a16:creationId xmlns:a16="http://schemas.microsoft.com/office/drawing/2014/main" id="{DED89D37-9432-4E9C-A201-71B459188A0C}"/>
-              </a:ext>
-            </a:extLst>
-          </p:cNvPr>
-          <p:cNvSpPr>
-            <a:spLocks noGrp="1"/>
-          </p:cNvSpPr>
-          <p:nvPr>
-            <p:ph type="title"/>
-          </p:nvPr>
-        </p:nvSpPr>
-        <p:spPr/>
-        <p:txBody>
-          <a:bodyPr/>
-          <a:lstStyle/>
-          <a:p>
-            <a:r>
-              <a:rPr lang="cs-CZ" dirty="0"/>
-              <a:t>Vstupní data</a:t>
-            </a:r>
-          </a:p>
-        </p:txBody>
-      </p:sp>
-      <p:sp>
-        <p:nvSpPr>
-          <p:cNvPr id="3" name="Zástupný obsah 2">
-            <a:extLst>
-              <a:ext uri="{FF2B5EF4-FFF2-40B4-BE49-F238E27FC236}">
-                <a16:creationId xmlns:a16="http://schemas.microsoft.com/office/drawing/2014/main" id="{A4A489E1-3057-4B0B-9D18-9B7FA06C1605}"/>
-              </a:ext>
-            </a:extLst>
-          </p:cNvPr>
-          <p:cNvSpPr>
-            <a:spLocks noGrp="1"/>
-          </p:cNvSpPr>
-          <p:nvPr>
-            <p:ph idx="1"/>
-          </p:nvPr>
-        </p:nvSpPr>
-        <p:spPr>
-          <a:xfrm>
-            <a:off x="1081238" y="1845734"/>
-            <a:ext cx="10058400" cy="4023360"/>
-          </a:xfrm>
-        </p:spPr>
-        <p:txBody>
-          <a:bodyPr/>
-          <a:lstStyle/>
-          <a:p>
-            <a:pPr>
-              <a:buFont typeface="Arial" panose="020B0604020202020204" pitchFamily="34" charset="0"/>
-              <a:buChar char="•"/>
-            </a:pPr>
-            <a:endParaRPr lang="cs-CZ" dirty="0"/>
-          </a:p>
-          <a:p>
-            <a:pPr>
-              <a:buFont typeface="Arial" panose="020B0604020202020204" pitchFamily="34" charset="0"/>
-              <a:buChar char="•"/>
-            </a:pPr>
-            <a:endParaRPr lang="cs-CZ" dirty="0"/>
-          </a:p>
-          <a:p>
-            <a:pPr>
-              <a:buFont typeface="Arial" panose="020B0604020202020204" pitchFamily="34" charset="0"/>
-              <a:buChar char="•"/>
-            </a:pPr>
-            <a:endParaRPr lang="cs-CZ" dirty="0"/>
-          </a:p>
-          <a:p>
-            <a:pPr>
-              <a:buFont typeface="Arial" panose="020B0604020202020204" pitchFamily="34" charset="0"/>
-              <a:buChar char="•"/>
-            </a:pPr>
-            <a:r>
-              <a:rPr lang="cs-CZ" b="1" dirty="0"/>
-              <a:t> </a:t>
-            </a:r>
-            <a:r>
-              <a:rPr lang="cs-CZ" b="1" dirty="0" err="1"/>
-              <a:t>Graphviz</a:t>
-            </a:r>
-            <a:r>
-              <a:rPr lang="cs-CZ" dirty="0"/>
-              <a:t> a jazyk </a:t>
-            </a:r>
-            <a:r>
-              <a:rPr lang="cs-CZ" b="1" dirty="0"/>
-              <a:t>DOT</a:t>
-            </a:r>
-          </a:p>
-          <a:p>
-            <a:pPr>
-              <a:buFont typeface="Arial" panose="020B0604020202020204" pitchFamily="34" charset="0"/>
-              <a:buChar char="•"/>
-            </a:pPr>
-            <a:r>
-              <a:rPr lang="cs-CZ" dirty="0"/>
-              <a:t> 3 formáty souborů - </a:t>
-            </a:r>
-            <a:r>
-              <a:rPr lang="cs-CZ" b="1" dirty="0"/>
-              <a:t>*.in</a:t>
-            </a:r>
-            <a:r>
-              <a:rPr lang="cs-CZ" dirty="0"/>
-              <a:t>, </a:t>
-            </a:r>
-            <a:r>
-              <a:rPr lang="cs-CZ" b="1" dirty="0"/>
-              <a:t>*.</a:t>
-            </a:r>
-            <a:r>
-              <a:rPr lang="cs-CZ" b="1" dirty="0" err="1"/>
-              <a:t>dot</a:t>
-            </a:r>
-            <a:r>
-              <a:rPr lang="cs-CZ" dirty="0"/>
-              <a:t>, </a:t>
-            </a:r>
-            <a:r>
-              <a:rPr lang="cs-CZ" b="1" dirty="0"/>
-              <a:t>*.</a:t>
-            </a:r>
-            <a:r>
-              <a:rPr lang="cs-CZ" b="1" dirty="0" err="1"/>
-              <a:t>png</a:t>
-            </a:r>
-            <a:endParaRPr lang="cs-CZ" b="1" dirty="0"/>
-          </a:p>
-          <a:p>
-            <a:endParaRPr lang="cs-CZ" dirty="0"/>
-          </a:p>
-        </p:txBody>
-      </p:sp>
-    </p:spTree>
-    <p:extLst>
-      <p:ext uri="{BB962C8B-B14F-4D97-AF65-F5344CB8AC3E}">
-        <p14:creationId xmlns:p14="http://schemas.microsoft.com/office/powerpoint/2010/main" val="2339351159"/>
-      </p:ext>
-    </p:extLst>
-  </p:cSld>
-  <p:clrMapOvr>
-    <a:masterClrMapping/>
-  </p:clrMapOvr>
-</p:sld>
-</file>
-
-<file path=ppt/slides/slide6.xml><?xml version="1.0" encoding="utf-8"?>
 <p:sld xmlns:a="http://schemas.openxmlformats.org/drawingml/2006/main" xmlns:r="http://schemas.openxmlformats.org/officeDocument/2006/relationships" xmlns:p="http://schemas.openxmlformats.org/presentationml/2006/main">
   <p:cSld>
     <p:spTree>
@@ -4843,7 +4779,7 @@
         </p:blipFill>
         <p:spPr>
           <a:xfrm>
-            <a:off x="1625999" y="1485900"/>
+            <a:off x="1022627" y="1485899"/>
             <a:ext cx="1466850" cy="4057650"/>
           </a:xfrm>
           <a:prstGeom prst="rect">
@@ -4873,7 +4809,7 @@
         </p:blipFill>
         <p:spPr>
           <a:xfrm>
-            <a:off x="4567237" y="1009650"/>
+            <a:off x="4567237" y="1009649"/>
             <a:ext cx="2752725" cy="4533900"/>
           </a:xfrm>
           <a:prstGeom prst="rect">
@@ -4895,7 +4831,7 @@
         </p:nvSpPr>
         <p:spPr>
           <a:xfrm>
-            <a:off x="1909621" y="5619565"/>
+            <a:off x="1306249" y="5619564"/>
             <a:ext cx="899605" cy="646331"/>
           </a:xfrm>
           <a:prstGeom prst="rect">
@@ -4996,6 +4932,84 @@
           </a:p>
         </p:txBody>
       </p:sp>
+      <p:sp>
+        <p:nvSpPr>
+          <p:cNvPr id="2" name="TextovéPole 1">
+            <a:extLst>
+              <a:ext uri="{FF2B5EF4-FFF2-40B4-BE49-F238E27FC236}">
+                <a16:creationId xmlns:a16="http://schemas.microsoft.com/office/drawing/2014/main" id="{75C1BA51-218B-4F19-9093-9449F95AA873}"/>
+              </a:ext>
+            </a:extLst>
+          </p:cNvPr>
+          <p:cNvSpPr txBox="1"/>
+          <p:nvPr/>
+        </p:nvSpPr>
+        <p:spPr>
+          <a:xfrm>
+            <a:off x="2565273" y="2963346"/>
+            <a:ext cx="1926168" cy="369332"/>
+          </a:xfrm>
+          <a:prstGeom prst="rect">
+            <a:avLst/>
+          </a:prstGeom>
+          <a:noFill/>
+        </p:spPr>
+        <p:txBody>
+          <a:bodyPr wrap="none" rtlCol="0">
+            <a:spAutoFit/>
+          </a:bodyPr>
+          <a:lstStyle/>
+          <a:p>
+            <a:r>
+              <a:rPr lang="cs-CZ" b="1" dirty="0"/>
+              <a:t>-&gt; python script -&gt;</a:t>
+            </a:r>
+          </a:p>
+        </p:txBody>
+      </p:sp>
+      <p:sp>
+        <p:nvSpPr>
+          <p:cNvPr id="3" name="TextovéPole 2">
+            <a:extLst>
+              <a:ext uri="{FF2B5EF4-FFF2-40B4-BE49-F238E27FC236}">
+                <a16:creationId xmlns:a16="http://schemas.microsoft.com/office/drawing/2014/main" id="{4262C978-9C49-4A2A-9FC5-F2D4483E34F0}"/>
+              </a:ext>
+            </a:extLst>
+          </p:cNvPr>
+          <p:cNvSpPr txBox="1"/>
+          <p:nvPr/>
+        </p:nvSpPr>
+        <p:spPr>
+          <a:xfrm>
+            <a:off x="7315895" y="2968663"/>
+            <a:ext cx="1500411" cy="369332"/>
+          </a:xfrm>
+          <a:prstGeom prst="rect">
+            <a:avLst/>
+          </a:prstGeom>
+          <a:noFill/>
+        </p:spPr>
+        <p:txBody>
+          <a:bodyPr wrap="none" rtlCol="0">
+            <a:spAutoFit/>
+          </a:bodyPr>
+          <a:lstStyle/>
+          <a:p>
+            <a:r>
+              <a:rPr lang="cs-CZ" b="1" dirty="0"/>
+              <a:t>-&gt; </a:t>
+            </a:r>
+            <a:r>
+              <a:rPr lang="cs-CZ" b="1" dirty="0" err="1"/>
+              <a:t>Graphviz</a:t>
+            </a:r>
+            <a:r>
+              <a:rPr lang="cs-CZ" b="1" dirty="0"/>
+              <a:t> -&gt;</a:t>
+            </a:r>
+          </a:p>
+        </p:txBody>
+      </p:sp>
     </p:spTree>
     <p:extLst>
       <p:ext uri="{BB962C8B-B14F-4D97-AF65-F5344CB8AC3E}">
@@ -5009,7 +5023,7 @@
 </p:sld>
 </file>
 
-<file path=ppt/slides/slide7.xml><?xml version="1.0" encoding="utf-8"?>
+<file path=ppt/slides/slide6.xml><?xml version="1.0" encoding="utf-8"?>
 <p:sld xmlns:a="http://schemas.openxmlformats.org/drawingml/2006/main" xmlns:r="http://schemas.openxmlformats.org/officeDocument/2006/relationships" xmlns:p="http://schemas.openxmlformats.org/presentationml/2006/main">
   <p:cSld>
     <p:spTree>
@@ -5105,7 +5119,7 @@
             </a:pPr>
             <a:r>
               <a:rPr lang="cs-CZ" sz="2400" dirty="0"/>
-              <a:t> průchod všech hran a rekurzivní volání</a:t>
+              <a:t> postupný průchod všemi zbylými hranami (rekurzivně)</a:t>
             </a:r>
           </a:p>
           <a:p>
@@ -5115,26 +5129,21 @@
             </a:pPr>
             <a:r>
               <a:rPr lang="cs-CZ" sz="2400" dirty="0"/>
-              <a:t> skončí neúspěšně pokud, byl vrchol v této konkrétní variantě cesty již prohledáván, a nebo při nalezení posledního vrcholu</a:t>
-            </a:r>
-          </a:p>
-          <a:p>
-            <a:pPr>
-              <a:buFont typeface="Arial" panose="020B0604020202020204" pitchFamily="34" charset="0"/>
-              <a:buChar char="•"/>
-            </a:pPr>
+              <a:t> </a:t>
+            </a:r>
+            <a:r>
+              <a:rPr lang="cs-CZ" sz="2400" b="1" dirty="0"/>
+              <a:t>bez uvedení</a:t>
+            </a:r>
             <a:r>
               <a:rPr lang="cs-CZ" sz="2400" dirty="0"/>
-              <a:t> bez uvedení počátečního a cílového vrcholu se vybere vrchol na prvním řádku ve zdrojovém grafu =&gt; hledá se tedy </a:t>
-            </a:r>
-            <a:r>
-              <a:rPr lang="cs-CZ" sz="2400" i="1" dirty="0" err="1"/>
-              <a:t>Hamiltonův</a:t>
-            </a:r>
-            <a:r>
-              <a:rPr lang="cs-CZ" sz="2400" i="1" dirty="0"/>
-              <a:t> cyklus</a:t>
-            </a:r>
+              <a:t> počátečního nebo cílového vrcholu =&gt; </a:t>
+            </a:r>
+            <a:r>
+              <a:rPr lang="cs-CZ" sz="2400" b="1" dirty="0"/>
+              <a:t>první vrchol</a:t>
+            </a:r>
+            <a:endParaRPr lang="cs-CZ" sz="2400" b="1" i="1" dirty="0"/>
           </a:p>
         </p:txBody>
       </p:sp>
@@ -5142,6 +5151,149 @@
     <p:extLst>
       <p:ext uri="{BB962C8B-B14F-4D97-AF65-F5344CB8AC3E}">
         <p14:creationId xmlns:p14="http://schemas.microsoft.com/office/powerpoint/2010/main" val="584233850"/>
+      </p:ext>
+    </p:extLst>
+  </p:cSld>
+  <p:clrMapOvr>
+    <a:masterClrMapping/>
+  </p:clrMapOvr>
+</p:sld>
+</file>
+
+<file path=ppt/slides/slide7.xml><?xml version="1.0" encoding="utf-8"?>
+<p:sld xmlns:a="http://schemas.openxmlformats.org/drawingml/2006/main" xmlns:r="http://schemas.openxmlformats.org/officeDocument/2006/relationships" xmlns:p="http://schemas.openxmlformats.org/presentationml/2006/main">
+  <p:cSld>
+    <p:spTree>
+      <p:nvGrpSpPr>
+        <p:cNvPr id="1" name=""/>
+        <p:cNvGrpSpPr/>
+        <p:nvPr/>
+      </p:nvGrpSpPr>
+      <p:grpSpPr>
+        <a:xfrm>
+          <a:off x="0" y="0"/>
+          <a:ext cx="0" cy="0"/>
+          <a:chOff x="0" y="0"/>
+          <a:chExt cx="0" cy="0"/>
+        </a:xfrm>
+      </p:grpSpPr>
+      <p:sp>
+        <p:nvSpPr>
+          <p:cNvPr id="2" name="Nadpis 1">
+            <a:extLst>
+              <a:ext uri="{FF2B5EF4-FFF2-40B4-BE49-F238E27FC236}">
+                <a16:creationId xmlns:a16="http://schemas.microsoft.com/office/drawing/2014/main" id="{F0057944-10CF-4E65-881D-3DE7A48D08B3}"/>
+              </a:ext>
+            </a:extLst>
+          </p:cNvPr>
+          <p:cNvSpPr>
+            <a:spLocks noGrp="1"/>
+          </p:cNvSpPr>
+          <p:nvPr>
+            <p:ph type="title"/>
+          </p:nvPr>
+        </p:nvSpPr>
+        <p:spPr/>
+        <p:txBody>
+          <a:bodyPr/>
+          <a:lstStyle/>
+          <a:p>
+            <a:r>
+              <a:rPr lang="cs-CZ" dirty="0"/>
+              <a:t>Vývoj algoritmu</a:t>
+            </a:r>
+          </a:p>
+        </p:txBody>
+      </p:sp>
+      <p:sp>
+        <p:nvSpPr>
+          <p:cNvPr id="3" name="Zástupný obsah 2">
+            <a:extLst>
+              <a:ext uri="{FF2B5EF4-FFF2-40B4-BE49-F238E27FC236}">
+                <a16:creationId xmlns:a16="http://schemas.microsoft.com/office/drawing/2014/main" id="{E81D0E4D-E05C-4072-904E-2F251B49A43A}"/>
+              </a:ext>
+            </a:extLst>
+          </p:cNvPr>
+          <p:cNvSpPr>
+            <a:spLocks noGrp="1"/>
+          </p:cNvSpPr>
+          <p:nvPr>
+            <p:ph idx="1"/>
+          </p:nvPr>
+        </p:nvSpPr>
+        <p:spPr/>
+        <p:txBody>
+          <a:bodyPr/>
+          <a:lstStyle/>
+          <a:p>
+            <a:endParaRPr lang="cs-CZ" dirty="0"/>
+          </a:p>
+          <a:p>
+            <a:pPr marL="201168" lvl="1" indent="0">
+              <a:buNone/>
+            </a:pPr>
+            <a:endParaRPr lang="cs-CZ" dirty="0"/>
+          </a:p>
+          <a:p>
+            <a:pPr marL="201168" lvl="1" indent="0">
+              <a:buNone/>
+            </a:pPr>
+            <a:endParaRPr lang="cs-CZ" b="1" dirty="0"/>
+          </a:p>
+          <a:p>
+            <a:pPr marL="201168" lvl="1" indent="0">
+              <a:buNone/>
+            </a:pPr>
+            <a:r>
+              <a:rPr lang="cs-CZ" sz="2400" b="1" dirty="0"/>
+              <a:t>Urychlení výpočtu programu:</a:t>
+            </a:r>
+          </a:p>
+          <a:p>
+            <a:pPr lvl="1"/>
+            <a:r>
+              <a:rPr lang="cs-CZ" sz="2000" dirty="0"/>
+              <a:t>Využití dostupných vláken – </a:t>
+            </a:r>
+            <a:r>
+              <a:rPr lang="cs-CZ" sz="2000" b="1" dirty="0"/>
+              <a:t>zavrhnuto</a:t>
+            </a:r>
+            <a:r>
+              <a:rPr lang="cs-CZ" sz="2000" dirty="0"/>
+              <a:t> (malý počet výpočetních kroků, příliš velká režie)</a:t>
+            </a:r>
+          </a:p>
+          <a:p>
+            <a:pPr lvl="1"/>
+            <a:endParaRPr lang="cs-CZ" dirty="0"/>
+          </a:p>
+          <a:p>
+            <a:pPr lvl="1"/>
+            <a:endParaRPr lang="cs-CZ" dirty="0"/>
+          </a:p>
+          <a:p>
+            <a:pPr marL="201168" lvl="1" indent="0">
+              <a:buNone/>
+            </a:pPr>
+            <a:r>
+              <a:rPr lang="cs-CZ" sz="2400" b="1" dirty="0"/>
+              <a:t>Snížení paměťové náročnosti:</a:t>
+            </a:r>
+          </a:p>
+          <a:p>
+            <a:pPr lvl="1"/>
+            <a:r>
+              <a:rPr lang="cs-CZ" sz="2000" dirty="0"/>
+              <a:t>Úprava datových typů (využíváním pouze potřebných bitů)	</a:t>
+            </a:r>
+          </a:p>
+        </p:txBody>
+      </p:sp>
+    </p:spTree>
+    <p:extLst>
+      <p:ext uri="{BB962C8B-B14F-4D97-AF65-F5344CB8AC3E}">
+        <p14:creationId xmlns:p14="http://schemas.microsoft.com/office/powerpoint/2010/main" val="4086527123"/>
       </p:ext>
     </p:extLst>
   </p:cSld>
@@ -11171,13 +11323,50 @@
           </a:xfrm>
         </p:spPr>
         <p:txBody>
-          <a:bodyPr/>
+          <a:bodyPr>
+            <a:normAutofit/>
+          </a:bodyPr>
           <a:lstStyle/>
           <a:p>
             <a:pPr algn="ctr"/>
             <a:r>
-              <a:rPr lang="cs-CZ" dirty="0"/>
+              <a:rPr lang="cs-CZ" sz="3600" dirty="0"/>
               <a:t>Prostor pro dotazy</a:t>
+            </a:r>
+          </a:p>
+        </p:txBody>
+      </p:sp>
+      <p:sp>
+        <p:nvSpPr>
+          <p:cNvPr id="3" name="TextovéPole 2">
+            <a:extLst>
+              <a:ext uri="{FF2B5EF4-FFF2-40B4-BE49-F238E27FC236}">
+                <a16:creationId xmlns:a16="http://schemas.microsoft.com/office/drawing/2014/main" id="{E739ED1A-A0EF-4062-84AE-C0E918F94C08}"/>
+              </a:ext>
+            </a:extLst>
+          </p:cNvPr>
+          <p:cNvSpPr txBox="1"/>
+          <p:nvPr/>
+        </p:nvSpPr>
+        <p:spPr>
+          <a:xfrm>
+            <a:off x="1066800" y="1028332"/>
+            <a:ext cx="5779363" cy="769441"/>
+          </a:xfrm>
+          <a:prstGeom prst="rect">
+            <a:avLst/>
+          </a:prstGeom>
+          <a:noFill/>
+        </p:spPr>
+        <p:txBody>
+          <a:bodyPr wrap="square" rtlCol="0">
+            <a:spAutoFit/>
+          </a:bodyPr>
+          <a:lstStyle/>
+          <a:p>
+            <a:r>
+              <a:rPr lang="cs-CZ" sz="4400" dirty="0"/>
+              <a:t>Děkujeme za pozornost</a:t>
             </a:r>
           </a:p>
         </p:txBody>

</xml_diff>